<commit_message>
Updated slides after second training iteration
</commit_message>
<xml_diff>
--- a/slides/Tag-2_5-GitLab-Runner.pptx
+++ b/slides/Tag-2_5-GitLab-Runner.pptx
@@ -10597,7 +10597,7 @@
               <a:pPr algn="ctr">
                 <a:defRPr/>
               </a:pPr>
-              <a:t>06.07.2024</a:t>
+              <a:t>10.07.2024</a:t>
             </a:fld>
             <a:endParaRPr lang="de-DE" sz="1000">
               <a:solidFill>
@@ -20208,6 +20208,12 @@
               <a:rPr lang="de-DE" b="1" dirty="0"/>
               <a:t>Windows</a:t>
             </a:r>
+          </a:p>
+          <a:p>
+            <a:pPr marL="0" indent="0">
+              <a:buNone/>
+            </a:pPr>
+            <a:endParaRPr lang="de-DE" b="1" dirty="0"/>
           </a:p>
           <a:p>
             <a:pPr marL="457200" indent="-457200">

</xml_diff>